<commit_message>
Updates in group presentation
Updates in group presentation (added NA graph for food index)
</commit_message>
<xml_diff>
--- a/Data_422_Presentation.pptx
+++ b/Data_422_Presentation.pptx
@@ -5,7 +5,7 @@
     <p:sldMasterId id="2147483648" r:id="rId1"/>
   </p:sldMasterIdLst>
   <p:notesMasterIdLst>
-    <p:notesMasterId r:id="rId17"/>
+    <p:notesMasterId r:id="rId18"/>
   </p:notesMasterIdLst>
   <p:sldIdLst>
     <p:sldId id="256" r:id="rId2"/>
@@ -20,9 +20,10 @@
     <p:sldId id="303" r:id="rId11"/>
     <p:sldId id="304" r:id="rId12"/>
     <p:sldId id="305" r:id="rId13"/>
-    <p:sldId id="306" r:id="rId14"/>
-    <p:sldId id="307" r:id="rId15"/>
-    <p:sldId id="308" r:id="rId16"/>
+    <p:sldId id="310" r:id="rId14"/>
+    <p:sldId id="306" r:id="rId15"/>
+    <p:sldId id="307" r:id="rId16"/>
+    <p:sldId id="308" r:id="rId17"/>
   </p:sldIdLst>
   <p:sldSz cx="12192000" cy="6858000"/>
   <p:notesSz cx="6858000" cy="9144000"/>
@@ -260,7 +261,7 @@
       <p15:sldGuideLst xmlns:p15="http://schemas.microsoft.com/office/powerpoint/2012/main"/>
     </p:ext>
     <p:ext uri="http://customooxmlschemas.google.com/">
-      <go:slidesCustomData xmlns="" xmlns:mc="http://schemas.openxmlformats.org/markup-compatibility/2006" xmlns:mv="urn:schemas-microsoft-com:mac:vml" xmlns:c="http://schemas.openxmlformats.org/drawingml/2006/chart" xmlns:dgm="http://schemas.openxmlformats.org/drawingml/2006/diagram" xmlns:o="urn:schemas-microsoft-com:office:office" xmlns:v="urn:schemas-microsoft-com:vml" xmlns:pvml="urn:schemas-microsoft-com:office:powerpoint" xmlns:com="http://schemas.openxmlformats.org/drawingml/2006/compatibility" xmlns:p14="http://schemas.microsoft.com/office/powerpoint/2010/main" xmlns:p15="http://schemas.microsoft.com/office/powerpoint/2012/main" xmlns:go="http://customooxmlschemas.google.com/" r:id="rId49" roundtripDataSignature="AMtx7mioHfPdgurOMAI9jy0XGn2Hcfxivw=="/>
+      <go:slidesCustomData xmlns:go="http://customooxmlschemas.google.com/" xmlns:p15="http://schemas.microsoft.com/office/powerpoint/2012/main" xmlns:p14="http://schemas.microsoft.com/office/powerpoint/2010/main" xmlns:com="http://schemas.openxmlformats.org/drawingml/2006/compatibility" xmlns:pvml="urn:schemas-microsoft-com:office:powerpoint" xmlns:v="urn:schemas-microsoft-com:vml" xmlns:o="urn:schemas-microsoft-com:office:office" xmlns:dgm="http://schemas.openxmlformats.org/drawingml/2006/diagram" xmlns:c="http://schemas.openxmlformats.org/drawingml/2006/chart" xmlns:mv="urn:schemas-microsoft-com:mac:vml" xmlns:mc="http://schemas.openxmlformats.org/markup-compatibility/2006" xmlns="" r:id="rId49" roundtripDataSignature="AMtx7mioHfPdgurOMAI9jy0XGn2Hcfxivw=="/>
     </p:ext>
   </p:extLst>
 </p:presentation>
@@ -1999,6 +2000,115 @@
     </p:spTree>
     <p:extLst>
       <p:ext uri="{BB962C8B-B14F-4D97-AF65-F5344CB8AC3E}">
+        <p14:creationId xmlns:p14="http://schemas.microsoft.com/office/powerpoint/2010/main" val="3272787661"/>
+      </p:ext>
+    </p:extLst>
+  </p:cSld>
+  <p:clrMapOvr>
+    <a:masterClrMapping/>
+  </p:clrMapOvr>
+</p:notes>
+</file>
+
+<file path=ppt/notesSlides/notesSlide14.xml><?xml version="1.0" encoding="utf-8"?>
+<p:notes xmlns:a="http://schemas.openxmlformats.org/drawingml/2006/main" xmlns:r="http://schemas.openxmlformats.org/officeDocument/2006/relationships" xmlns:p="http://schemas.openxmlformats.org/presentationml/2006/main" showMasterSp="0" showMasterPhAnim="0">
+  <p:cSld>
+    <p:spTree>
+      <p:nvGrpSpPr>
+        <p:cNvPr id="1" name="Shape 144"/>
+        <p:cNvGrpSpPr/>
+        <p:nvPr/>
+      </p:nvGrpSpPr>
+      <p:grpSpPr>
+        <a:xfrm>
+          <a:off x="0" y="0"/>
+          <a:ext cx="0" cy="0"/>
+          <a:chOff x="0" y="0"/>
+          <a:chExt cx="0" cy="0"/>
+        </a:xfrm>
+      </p:grpSpPr>
+      <p:sp>
+        <p:nvSpPr>
+          <p:cNvPr id="145" name="Google Shape;145;p5:notes"/>
+          <p:cNvSpPr txBox="1">
+            <a:spLocks noGrp="1"/>
+          </p:cNvSpPr>
+          <p:nvPr>
+            <p:ph type="body" idx="1"/>
+          </p:nvPr>
+        </p:nvSpPr>
+        <p:spPr>
+          <a:xfrm>
+            <a:off x="685800" y="4400550"/>
+            <a:ext cx="5486400" cy="3600450"/>
+          </a:xfrm>
+          <a:prstGeom prst="rect">
+            <a:avLst/>
+          </a:prstGeom>
+        </p:spPr>
+        <p:txBody>
+          <a:bodyPr spcFirstLastPara="1" wrap="square" lIns="91425" tIns="45700" rIns="91425" bIns="45700" anchor="t" anchorCtr="0">
+            <a:noAutofit/>
+          </a:bodyPr>
+          <a:lstStyle/>
+          <a:p>
+            <a:pPr marL="0" lvl="0" indent="0" algn="l" rtl="0">
+              <a:spcBef>
+                <a:spcPts val="0"/>
+              </a:spcBef>
+              <a:spcAft>
+                <a:spcPts val="0"/>
+              </a:spcAft>
+              <a:buNone/>
+            </a:pPr>
+            <a:endParaRPr/>
+          </a:p>
+        </p:txBody>
+      </p:sp>
+      <p:sp>
+        <p:nvSpPr>
+          <p:cNvPr id="146" name="Google Shape;146;p5:notes"/>
+          <p:cNvSpPr>
+            <a:spLocks noGrp="1" noRot="1" noChangeAspect="1"/>
+          </p:cNvSpPr>
+          <p:nvPr>
+            <p:ph type="sldImg" idx="2"/>
+          </p:nvPr>
+        </p:nvSpPr>
+        <p:spPr>
+          <a:xfrm>
+            <a:off x="685800" y="1143000"/>
+            <a:ext cx="5486400" cy="3086100"/>
+          </a:xfrm>
+          <a:custGeom>
+            <a:avLst/>
+            <a:gdLst/>
+            <a:ahLst/>
+            <a:cxnLst/>
+            <a:rect l="l" t="t" r="r" b="b"/>
+            <a:pathLst>
+              <a:path w="120000" h="120000" extrusionOk="0">
+                <a:moveTo>
+                  <a:pt x="0" y="0"/>
+                </a:moveTo>
+                <a:lnTo>
+                  <a:pt x="120000" y="0"/>
+                </a:lnTo>
+                <a:lnTo>
+                  <a:pt x="120000" y="120000"/>
+                </a:lnTo>
+                <a:lnTo>
+                  <a:pt x="0" y="120000"/>
+                </a:lnTo>
+                <a:close/>
+              </a:path>
+            </a:pathLst>
+          </a:custGeom>
+        </p:spPr>
+      </p:sp>
+    </p:spTree>
+    <p:extLst>
+      <p:ext uri="{BB962C8B-B14F-4D97-AF65-F5344CB8AC3E}">
         <p14:creationId xmlns:p14="http://schemas.microsoft.com/office/powerpoint/2010/main" val="4268284511"/>
       </p:ext>
     </p:extLst>
@@ -2009,7 +2119,7 @@
 </p:notes>
 </file>
 
-<file path=ppt/notesSlides/notesSlide14.xml><?xml version="1.0" encoding="utf-8"?>
+<file path=ppt/notesSlides/notesSlide15.xml><?xml version="1.0" encoding="utf-8"?>
 <p:notes xmlns:a="http://schemas.openxmlformats.org/drawingml/2006/main" xmlns:r="http://schemas.openxmlformats.org/officeDocument/2006/relationships" xmlns:p="http://schemas.openxmlformats.org/presentationml/2006/main" showMasterSp="0" showMasterPhAnim="0">
   <p:cSld>
     <p:spTree>
@@ -14150,10 +14260,14 @@
               <a:buNone/>
             </a:pPr>
             <a:r>
-              <a:rPr lang="en-IN" dirty="0" smtClean="0"/>
-              <a:t>IMPORTS AND EXPORTS IN NEW ZEALAND</a:t>
+              <a:rPr lang="en-IN" sz="6000" dirty="0" smtClean="0"/>
+              <a:t>ANALYSIS OF IMPORTS </a:t>
             </a:r>
-            <a:endParaRPr dirty="0"/>
+            <a:r>
+              <a:rPr lang="en-IN" sz="6000" dirty="0" smtClean="0"/>
+              <a:t>AND EXPORTS IN NEW ZEALAND</a:t>
+            </a:r>
+            <a:endParaRPr sz="6000" dirty="0"/>
           </a:p>
         </p:txBody>
       </p:sp>
@@ -15560,7 +15674,7 @@
       </p:sp>
       <p:pic>
         <p:nvPicPr>
-          <p:cNvPr id="3" name="Picture 2"/>
+          <p:cNvPr id="2" name="Picture 1"/>
           <p:cNvPicPr>
             <a:picLocks noChangeAspect="1"/>
           </p:cNvPicPr>
@@ -15574,8 +15688,8 @@
         </p:blipFill>
         <p:spPr>
           <a:xfrm>
-            <a:off x="1088135" y="2157304"/>
-            <a:ext cx="8055865" cy="4023573"/>
+            <a:off x="1189415" y="2086811"/>
+            <a:ext cx="8596029" cy="4034908"/>
           </a:xfrm>
           <a:prstGeom prst="rect">
             <a:avLst/>
@@ -15584,7 +15698,7 @@
       </p:pic>
       <p:sp>
         <p:nvSpPr>
-          <p:cNvPr id="10" name="Google Shape;118;p2"/>
+          <p:cNvPr id="9" name="Google Shape;118;p2"/>
           <p:cNvSpPr txBox="1">
             <a:spLocks/>
           </p:cNvSpPr>
@@ -15857,12 +15971,27 @@
           <a:p>
             <a:pPr marL="182880" indent="-74929">
               <a:buSzPts val="1700"/>
-              <a:buFont typeface="Noto Sans Symbols"/>
               <a:buNone/>
             </a:pPr>
             <a:r>
               <a:rPr lang="en-PH" dirty="0" smtClean="0"/>
-              <a:t>Immigration and Import Rates based on Countries</a:t>
+              <a:t>Graph for NAs of </a:t>
+            </a:r>
+            <a:r>
+              <a:rPr lang="en-PH" dirty="0"/>
+              <a:t>the </a:t>
+            </a:r>
+            <a:r>
+              <a:rPr lang="en-PH" dirty="0" smtClean="0"/>
+              <a:t>Food </a:t>
+            </a:r>
+            <a:r>
+              <a:rPr lang="en-PH" dirty="0"/>
+              <a:t>Price Index </a:t>
+            </a:r>
+            <a:r>
+              <a:rPr lang="en-PH" dirty="0" smtClean="0"/>
+              <a:t>dataset</a:t>
             </a:r>
             <a:endParaRPr lang="en-PH" dirty="0"/>
           </a:p>
@@ -15871,7 +16000,7 @@
     </p:spTree>
     <p:extLst>
       <p:ext uri="{BB962C8B-B14F-4D97-AF65-F5344CB8AC3E}">
-        <p14:creationId xmlns:p14="http://schemas.microsoft.com/office/powerpoint/2010/main" val="1594663750"/>
+        <p14:creationId xmlns:p14="http://schemas.microsoft.com/office/powerpoint/2010/main" val="3993404320"/>
       </p:ext>
     </p:extLst>
   </p:cSld>
@@ -16169,6 +16298,615 @@
       </p:sp>
       <p:pic>
         <p:nvPicPr>
+          <p:cNvPr id="3" name="Picture 2"/>
+          <p:cNvPicPr>
+            <a:picLocks noChangeAspect="1"/>
+          </p:cNvPicPr>
+          <p:nvPr/>
+        </p:nvPicPr>
+        <p:blipFill>
+          <a:blip r:embed="rId3"/>
+          <a:stretch>
+            <a:fillRect/>
+          </a:stretch>
+        </p:blipFill>
+        <p:spPr>
+          <a:xfrm>
+            <a:off x="1088135" y="2157304"/>
+            <a:ext cx="8055865" cy="4023573"/>
+          </a:xfrm>
+          <a:prstGeom prst="rect">
+            <a:avLst/>
+          </a:prstGeom>
+        </p:spPr>
+      </p:pic>
+      <p:sp>
+        <p:nvSpPr>
+          <p:cNvPr id="10" name="Google Shape;118;p2"/>
+          <p:cNvSpPr txBox="1">
+            <a:spLocks/>
+          </p:cNvSpPr>
+          <p:nvPr/>
+        </p:nvSpPr>
+        <p:spPr>
+          <a:xfrm>
+            <a:off x="2003469" y="1624659"/>
+            <a:ext cx="5960955" cy="473656"/>
+          </a:xfrm>
+          <a:prstGeom prst="rect">
+            <a:avLst/>
+          </a:prstGeom>
+          <a:noFill/>
+          <a:ln>
+            <a:noFill/>
+          </a:ln>
+        </p:spPr>
+        <p:txBody>
+          <a:bodyPr spcFirstLastPara="1" wrap="square" lIns="91425" tIns="45700" rIns="91425" bIns="45700" anchor="t" anchorCtr="0">
+            <a:normAutofit fontScale="92500" lnSpcReduction="20000"/>
+          </a:bodyPr>
+          <a:lstStyle>
+            <a:defPPr marR="0" lvl="0" algn="l" rtl="0">
+              <a:lnSpc>
+                <a:spcPct val="100000"/>
+              </a:lnSpc>
+              <a:spcBef>
+                <a:spcPts val="0"/>
+              </a:spcBef>
+              <a:spcAft>
+                <a:spcPts val="0"/>
+              </a:spcAft>
+            </a:defPPr>
+            <a:lvl1pPr marL="457200" marR="0" lvl="0" indent="-325755" algn="l" rtl="0">
+              <a:lnSpc>
+                <a:spcPct val="90000"/>
+              </a:lnSpc>
+              <a:spcBef>
+                <a:spcPts val="1200"/>
+              </a:spcBef>
+              <a:spcAft>
+                <a:spcPts val="0"/>
+              </a:spcAft>
+              <a:buClr>
+                <a:srgbClr val="548BB7"/>
+              </a:buClr>
+              <a:buSzPts val="1530"/>
+              <a:buFont typeface="Noto Sans Symbols"/>
+              <a:buChar char="▪"/>
+              <a:defRPr sz="2000" b="0" i="0" u="none" strike="noStrike" cap="none">
+                <a:solidFill>
+                  <a:schemeClr val="dk1"/>
+                </a:solidFill>
+                <a:latin typeface="Trebuchet MS"/>
+                <a:ea typeface="Trebuchet MS"/>
+                <a:cs typeface="Trebuchet MS"/>
+                <a:sym typeface="Trebuchet MS"/>
+              </a:defRPr>
+            </a:lvl1pPr>
+            <a:lvl2pPr marL="914400" marR="0" lvl="1" indent="-325755" algn="l" rtl="0">
+              <a:lnSpc>
+                <a:spcPct val="90000"/>
+              </a:lnSpc>
+              <a:spcBef>
+                <a:spcPts val="400"/>
+              </a:spcBef>
+              <a:spcAft>
+                <a:spcPts val="0"/>
+              </a:spcAft>
+              <a:buClr>
+                <a:srgbClr val="548BB7"/>
+              </a:buClr>
+              <a:buSzPts val="1530"/>
+              <a:buFont typeface="Noto Sans Symbols"/>
+              <a:buChar char="▪"/>
+              <a:defRPr sz="1800" b="0" i="0" u="none" strike="noStrike" cap="none">
+                <a:solidFill>
+                  <a:schemeClr val="dk1"/>
+                </a:solidFill>
+                <a:latin typeface="Trebuchet MS"/>
+                <a:ea typeface="Trebuchet MS"/>
+                <a:cs typeface="Trebuchet MS"/>
+                <a:sym typeface="Trebuchet MS"/>
+              </a:defRPr>
+            </a:lvl2pPr>
+            <a:lvl3pPr marL="1371600" marR="0" lvl="2" indent="-325755" algn="l" rtl="0">
+              <a:lnSpc>
+                <a:spcPct val="90000"/>
+              </a:lnSpc>
+              <a:spcBef>
+                <a:spcPts val="400"/>
+              </a:spcBef>
+              <a:spcAft>
+                <a:spcPts val="0"/>
+              </a:spcAft>
+              <a:buClr>
+                <a:srgbClr val="548BB7"/>
+              </a:buClr>
+              <a:buSzPts val="1530"/>
+              <a:buFont typeface="Noto Sans Symbols"/>
+              <a:buChar char="▪"/>
+              <a:defRPr sz="1600" b="0" i="0" u="none" strike="noStrike" cap="none">
+                <a:solidFill>
+                  <a:schemeClr val="dk1"/>
+                </a:solidFill>
+                <a:latin typeface="Trebuchet MS"/>
+                <a:ea typeface="Trebuchet MS"/>
+                <a:cs typeface="Trebuchet MS"/>
+                <a:sym typeface="Trebuchet MS"/>
+              </a:defRPr>
+            </a:lvl3pPr>
+            <a:lvl4pPr marL="1828800" marR="0" lvl="3" indent="-325755" algn="l" rtl="0">
+              <a:lnSpc>
+                <a:spcPct val="90000"/>
+              </a:lnSpc>
+              <a:spcBef>
+                <a:spcPts val="400"/>
+              </a:spcBef>
+              <a:spcAft>
+                <a:spcPts val="0"/>
+              </a:spcAft>
+              <a:buClr>
+                <a:srgbClr val="548BB7"/>
+              </a:buClr>
+              <a:buSzPts val="1530"/>
+              <a:buFont typeface="Noto Sans Symbols"/>
+              <a:buChar char="▪"/>
+              <a:defRPr sz="1600" b="0" i="0" u="none" strike="noStrike" cap="none">
+                <a:solidFill>
+                  <a:schemeClr val="dk1"/>
+                </a:solidFill>
+                <a:latin typeface="Trebuchet MS"/>
+                <a:ea typeface="Trebuchet MS"/>
+                <a:cs typeface="Trebuchet MS"/>
+                <a:sym typeface="Trebuchet MS"/>
+              </a:defRPr>
+            </a:lvl4pPr>
+            <a:lvl5pPr marL="2286000" marR="0" lvl="4" indent="-325754" algn="l" rtl="0">
+              <a:lnSpc>
+                <a:spcPct val="90000"/>
+              </a:lnSpc>
+              <a:spcBef>
+                <a:spcPts val="400"/>
+              </a:spcBef>
+              <a:spcAft>
+                <a:spcPts val="0"/>
+              </a:spcAft>
+              <a:buClr>
+                <a:srgbClr val="548BB7"/>
+              </a:buClr>
+              <a:buSzPts val="1530"/>
+              <a:buFont typeface="Noto Sans Symbols"/>
+              <a:buChar char="▪"/>
+              <a:defRPr sz="1600" b="0" i="0" u="none" strike="noStrike" cap="none">
+                <a:solidFill>
+                  <a:schemeClr val="dk1"/>
+                </a:solidFill>
+                <a:latin typeface="Trebuchet MS"/>
+                <a:ea typeface="Trebuchet MS"/>
+                <a:cs typeface="Trebuchet MS"/>
+                <a:sym typeface="Trebuchet MS"/>
+              </a:defRPr>
+            </a:lvl5pPr>
+            <a:lvl6pPr marL="2743200" marR="0" lvl="5" indent="-325754" algn="l" rtl="0">
+              <a:lnSpc>
+                <a:spcPct val="90000"/>
+              </a:lnSpc>
+              <a:spcBef>
+                <a:spcPts val="400"/>
+              </a:spcBef>
+              <a:spcAft>
+                <a:spcPts val="0"/>
+              </a:spcAft>
+              <a:buClr>
+                <a:srgbClr val="548BB7"/>
+              </a:buClr>
+              <a:buSzPts val="1530"/>
+              <a:buFont typeface="Noto Sans Symbols"/>
+              <a:buChar char="▪"/>
+              <a:defRPr sz="1600" b="0" i="0" u="none" strike="noStrike" cap="none">
+                <a:solidFill>
+                  <a:schemeClr val="dk1"/>
+                </a:solidFill>
+                <a:latin typeface="Trebuchet MS"/>
+                <a:ea typeface="Trebuchet MS"/>
+                <a:cs typeface="Trebuchet MS"/>
+                <a:sym typeface="Trebuchet MS"/>
+              </a:defRPr>
+            </a:lvl6pPr>
+            <a:lvl7pPr marL="3200400" marR="0" lvl="6" indent="-325754" algn="l" rtl="0">
+              <a:lnSpc>
+                <a:spcPct val="90000"/>
+              </a:lnSpc>
+              <a:spcBef>
+                <a:spcPts val="400"/>
+              </a:spcBef>
+              <a:spcAft>
+                <a:spcPts val="0"/>
+              </a:spcAft>
+              <a:buClr>
+                <a:srgbClr val="548BB7"/>
+              </a:buClr>
+              <a:buSzPts val="1530"/>
+              <a:buFont typeface="Noto Sans Symbols"/>
+              <a:buChar char="▪"/>
+              <a:defRPr sz="1600" b="0" i="0" u="none" strike="noStrike" cap="none">
+                <a:solidFill>
+                  <a:schemeClr val="dk1"/>
+                </a:solidFill>
+                <a:latin typeface="Trebuchet MS"/>
+                <a:ea typeface="Trebuchet MS"/>
+                <a:cs typeface="Trebuchet MS"/>
+                <a:sym typeface="Trebuchet MS"/>
+              </a:defRPr>
+            </a:lvl7pPr>
+            <a:lvl8pPr marL="3657600" marR="0" lvl="7" indent="-325754" algn="l" rtl="0">
+              <a:lnSpc>
+                <a:spcPct val="90000"/>
+              </a:lnSpc>
+              <a:spcBef>
+                <a:spcPts val="400"/>
+              </a:spcBef>
+              <a:spcAft>
+                <a:spcPts val="0"/>
+              </a:spcAft>
+              <a:buClr>
+                <a:srgbClr val="548BB7"/>
+              </a:buClr>
+              <a:buSzPts val="1530"/>
+              <a:buFont typeface="Noto Sans Symbols"/>
+              <a:buChar char="▪"/>
+              <a:defRPr sz="1600" b="0" i="0" u="none" strike="noStrike" cap="none">
+                <a:solidFill>
+                  <a:schemeClr val="dk1"/>
+                </a:solidFill>
+                <a:latin typeface="Trebuchet MS"/>
+                <a:ea typeface="Trebuchet MS"/>
+                <a:cs typeface="Trebuchet MS"/>
+                <a:sym typeface="Trebuchet MS"/>
+              </a:defRPr>
+            </a:lvl8pPr>
+            <a:lvl9pPr marL="4114800" marR="0" lvl="8" indent="-325754" algn="l" rtl="0">
+              <a:lnSpc>
+                <a:spcPct val="90000"/>
+              </a:lnSpc>
+              <a:spcBef>
+                <a:spcPts val="400"/>
+              </a:spcBef>
+              <a:spcAft>
+                <a:spcPts val="200"/>
+              </a:spcAft>
+              <a:buClr>
+                <a:srgbClr val="548BB7"/>
+              </a:buClr>
+              <a:buSzPts val="1530"/>
+              <a:buFont typeface="Noto Sans Symbols"/>
+              <a:buChar char="▪"/>
+              <a:defRPr sz="1600" b="0" i="0" u="none" strike="noStrike" cap="none">
+                <a:solidFill>
+                  <a:schemeClr val="dk1"/>
+                </a:solidFill>
+                <a:latin typeface="Trebuchet MS"/>
+                <a:ea typeface="Trebuchet MS"/>
+                <a:cs typeface="Trebuchet MS"/>
+                <a:sym typeface="Trebuchet MS"/>
+              </a:defRPr>
+            </a:lvl9pPr>
+          </a:lstStyle>
+          <a:p>
+            <a:pPr marL="182880" indent="-74929">
+              <a:buSzPts val="1700"/>
+              <a:buFont typeface="Noto Sans Symbols"/>
+              <a:buNone/>
+            </a:pPr>
+            <a:r>
+              <a:rPr lang="en-PH" dirty="0" smtClean="0"/>
+              <a:t>Immigration and Import Rates based on Countries</a:t>
+            </a:r>
+            <a:endParaRPr lang="en-PH" dirty="0"/>
+          </a:p>
+        </p:txBody>
+      </p:sp>
+    </p:spTree>
+    <p:extLst>
+      <p:ext uri="{BB962C8B-B14F-4D97-AF65-F5344CB8AC3E}">
+        <p14:creationId xmlns:p14="http://schemas.microsoft.com/office/powerpoint/2010/main" val="1594663750"/>
+      </p:ext>
+    </p:extLst>
+  </p:cSld>
+  <p:clrMapOvr>
+    <a:masterClrMapping/>
+  </p:clrMapOvr>
+  <p:timing>
+    <p:tnLst>
+      <p:par>
+        <p:cTn id="1" dur="indefinite" restart="never" nodeType="tmRoot"/>
+      </p:par>
+    </p:tnLst>
+  </p:timing>
+</p:sld>
+</file>
+
+<file path=ppt/slides/slide15.xml><?xml version="1.0" encoding="utf-8"?>
+<p:sld xmlns:a="http://schemas.openxmlformats.org/drawingml/2006/main" xmlns:r="http://schemas.openxmlformats.org/officeDocument/2006/relationships" xmlns:p="http://schemas.openxmlformats.org/presentationml/2006/main">
+  <p:cSld>
+    <p:spTree>
+      <p:nvGrpSpPr>
+        <p:cNvPr id="1" name="Shape 147"/>
+        <p:cNvGrpSpPr/>
+        <p:nvPr/>
+      </p:nvGrpSpPr>
+      <p:grpSpPr>
+        <a:xfrm>
+          <a:off x="0" y="0"/>
+          <a:ext cx="0" cy="0"/>
+          <a:chOff x="0" y="0"/>
+          <a:chExt cx="0" cy="0"/>
+        </a:xfrm>
+      </p:grpSpPr>
+      <p:sp>
+        <p:nvSpPr>
+          <p:cNvPr id="148" name="Google Shape;148;p5"/>
+          <p:cNvSpPr txBox="1">
+            <a:spLocks noGrp="1"/>
+          </p:cNvSpPr>
+          <p:nvPr>
+            <p:ph type="title"/>
+          </p:nvPr>
+        </p:nvSpPr>
+        <p:spPr>
+          <a:xfrm>
+            <a:off x="1069848" y="484632"/>
+            <a:ext cx="10058400" cy="1609344"/>
+          </a:xfrm>
+          <a:prstGeom prst="rect">
+            <a:avLst/>
+          </a:prstGeom>
+          <a:noFill/>
+          <a:ln>
+            <a:noFill/>
+          </a:ln>
+        </p:spPr>
+        <p:txBody>
+          <a:bodyPr spcFirstLastPara="1" wrap="square" lIns="91425" tIns="45700" rIns="91425" bIns="45700" anchor="ctr" anchorCtr="0">
+            <a:normAutofit/>
+          </a:bodyPr>
+          <a:lstStyle/>
+          <a:p>
+            <a:pPr>
+              <a:buSzPts val="4800"/>
+            </a:pPr>
+            <a:r>
+              <a:rPr lang="en-PH" dirty="0" smtClean="0"/>
+              <a:t>Exploration </a:t>
+            </a:r>
+            <a:r>
+              <a:rPr lang="en-PH" dirty="0"/>
+              <a:t>of the </a:t>
+            </a:r>
+            <a:r>
+              <a:rPr lang="en-PH" dirty="0" smtClean="0"/>
+              <a:t>data:</a:t>
+            </a:r>
+            <a:endParaRPr dirty="0"/>
+          </a:p>
+        </p:txBody>
+      </p:sp>
+      <p:sp>
+        <p:nvSpPr>
+          <p:cNvPr id="149" name="Google Shape;149;p5"/>
+          <p:cNvSpPr txBox="1">
+            <a:spLocks noGrp="1"/>
+          </p:cNvSpPr>
+          <p:nvPr>
+            <p:ph type="body" idx="1"/>
+          </p:nvPr>
+        </p:nvSpPr>
+        <p:spPr>
+          <a:xfrm>
+            <a:off x="1069848" y="2121408"/>
+            <a:ext cx="10058400" cy="4050792"/>
+          </a:xfrm>
+          <a:prstGeom prst="rect">
+            <a:avLst/>
+          </a:prstGeom>
+          <a:noFill/>
+          <a:ln>
+            <a:noFill/>
+          </a:ln>
+        </p:spPr>
+        <p:txBody>
+          <a:bodyPr spcFirstLastPara="1" wrap="square" lIns="91425" tIns="45700" rIns="91425" bIns="45700" anchor="t" anchorCtr="0">
+            <a:normAutofit/>
+          </a:bodyPr>
+          <a:lstStyle/>
+          <a:p>
+            <a:pPr marL="182880" lvl="0" indent="0" algn="l" rtl="0">
+              <a:lnSpc>
+                <a:spcPct val="90000"/>
+              </a:lnSpc>
+              <a:spcBef>
+                <a:spcPts val="0"/>
+              </a:spcBef>
+              <a:spcAft>
+                <a:spcPts val="0"/>
+              </a:spcAft>
+              <a:buSzPts val="3400"/>
+              <a:buNone/>
+            </a:pPr>
+            <a:endParaRPr sz="4000" dirty="0"/>
+          </a:p>
+          <a:p>
+            <a:pPr marL="182880" lvl="0" indent="0" algn="l" rtl="0">
+              <a:lnSpc>
+                <a:spcPct val="90000"/>
+              </a:lnSpc>
+              <a:spcBef>
+                <a:spcPts val="1200"/>
+              </a:spcBef>
+              <a:spcAft>
+                <a:spcPts val="0"/>
+              </a:spcAft>
+              <a:buSzPts val="3400"/>
+              <a:buNone/>
+            </a:pPr>
+            <a:endParaRPr sz="4000" dirty="0"/>
+          </a:p>
+          <a:p>
+            <a:pPr marL="182880" lvl="0" indent="0" algn="l" rtl="0">
+              <a:lnSpc>
+                <a:spcPct val="90000"/>
+              </a:lnSpc>
+              <a:spcBef>
+                <a:spcPts val="1200"/>
+              </a:spcBef>
+              <a:spcAft>
+                <a:spcPts val="0"/>
+              </a:spcAft>
+              <a:buSzPts val="3400"/>
+              <a:buNone/>
+            </a:pPr>
+            <a:endParaRPr sz="4000" dirty="0"/>
+          </a:p>
+          <a:p>
+            <a:pPr marL="182880" lvl="0" indent="-74929" algn="l" rtl="0">
+              <a:lnSpc>
+                <a:spcPct val="90000"/>
+              </a:lnSpc>
+              <a:spcBef>
+                <a:spcPts val="1200"/>
+              </a:spcBef>
+              <a:spcAft>
+                <a:spcPts val="0"/>
+              </a:spcAft>
+              <a:buSzPts val="1700"/>
+              <a:buNone/>
+            </a:pPr>
+            <a:endParaRPr dirty="0"/>
+          </a:p>
+        </p:txBody>
+      </p:sp>
+      <p:sp>
+        <p:nvSpPr>
+          <p:cNvPr id="152" name="Google Shape;152;p5"/>
+          <p:cNvSpPr txBox="1">
+            <a:spLocks noGrp="1"/>
+          </p:cNvSpPr>
+          <p:nvPr>
+            <p:ph type="ftr" idx="11"/>
+          </p:nvPr>
+        </p:nvSpPr>
+        <p:spPr>
+          <a:xfrm>
+            <a:off x="1088136" y="6272784"/>
+            <a:ext cx="6327648" cy="365125"/>
+          </a:xfrm>
+          <a:prstGeom prst="rect">
+            <a:avLst/>
+          </a:prstGeom>
+          <a:noFill/>
+          <a:ln>
+            <a:noFill/>
+          </a:ln>
+        </p:spPr>
+        <p:txBody>
+          <a:bodyPr spcFirstLastPara="1" wrap="square" lIns="91425" tIns="45700" rIns="91425" bIns="45700" anchor="ctr" anchorCtr="0">
+            <a:noAutofit/>
+          </a:bodyPr>
+          <a:lstStyle/>
+          <a:p>
+            <a:pPr lvl="0"/>
+            <a:r>
+              <a:rPr lang="en-IN" dirty="0"/>
+              <a:t>DATA 422 GROUP PROJECT</a:t>
+            </a:r>
+          </a:p>
+        </p:txBody>
+      </p:sp>
+      <p:sp>
+        <p:nvSpPr>
+          <p:cNvPr id="153" name="Google Shape;153;p5"/>
+          <p:cNvSpPr txBox="1">
+            <a:spLocks noGrp="1"/>
+          </p:cNvSpPr>
+          <p:nvPr>
+            <p:ph type="dt" idx="10"/>
+          </p:nvPr>
+        </p:nvSpPr>
+        <p:spPr>
+          <a:xfrm>
+            <a:off x="7964424" y="6272784"/>
+            <a:ext cx="3273552" cy="365125"/>
+          </a:xfrm>
+          <a:prstGeom prst="rect">
+            <a:avLst/>
+          </a:prstGeom>
+          <a:noFill/>
+          <a:ln>
+            <a:noFill/>
+          </a:ln>
+        </p:spPr>
+        <p:txBody>
+          <a:bodyPr spcFirstLastPara="1" wrap="square" lIns="91425" tIns="45700" rIns="91425" bIns="45700" anchor="ctr" anchorCtr="0">
+            <a:noAutofit/>
+          </a:bodyPr>
+          <a:lstStyle/>
+          <a:p>
+            <a:pPr lvl="0"/>
+            <a:r>
+              <a:rPr lang="en-IN" dirty="0"/>
+              <a:t>17/10/2019</a:t>
+            </a:r>
+          </a:p>
+        </p:txBody>
+      </p:sp>
+      <p:sp>
+        <p:nvSpPr>
+          <p:cNvPr id="154" name="Google Shape;154;p5"/>
+          <p:cNvSpPr txBox="1">
+            <a:spLocks noGrp="1"/>
+          </p:cNvSpPr>
+          <p:nvPr>
+            <p:ph type="sldNum" idx="12"/>
+          </p:nvPr>
+        </p:nvSpPr>
+        <p:spPr>
+          <a:xfrm>
+            <a:off x="11311128" y="6272784"/>
+            <a:ext cx="640080" cy="365125"/>
+          </a:xfrm>
+          <a:prstGeom prst="rect">
+            <a:avLst/>
+          </a:prstGeom>
+          <a:noFill/>
+          <a:ln>
+            <a:noFill/>
+          </a:ln>
+        </p:spPr>
+        <p:txBody>
+          <a:bodyPr spcFirstLastPara="1" wrap="square" lIns="91425" tIns="45700" rIns="91425" bIns="45700" anchor="ctr" anchorCtr="0">
+            <a:noAutofit/>
+          </a:bodyPr>
+          <a:lstStyle/>
+          <a:p>
+            <a:pPr marL="0" lvl="0" indent="0" algn="ctr" rtl="0">
+              <a:spcBef>
+                <a:spcPts val="0"/>
+              </a:spcBef>
+              <a:spcAft>
+                <a:spcPts val="0"/>
+              </a:spcAft>
+              <a:buNone/>
+            </a:pPr>
+            <a:fld id="{00000000-1234-1234-1234-123412341234}" type="slidenum">
+              <a:rPr lang="en-IN"/>
+              <a:t>15</a:t>
+            </a:fld>
+            <a:endParaRPr/>
+          </a:p>
+        </p:txBody>
+      </p:sp>
+      <p:pic>
+        <p:nvPicPr>
           <p:cNvPr id="2" name="Picture 1"/>
           <p:cNvPicPr>
             <a:picLocks noChangeAspect="1"/>
@@ -16497,7 +17235,7 @@
 </p:sld>
 </file>
 
-<file path=ppt/slides/slide15.xml><?xml version="1.0" encoding="utf-8"?>
+<file path=ppt/slides/slide16.xml><?xml version="1.0" encoding="utf-8"?>
 <p:sld xmlns:a="http://schemas.openxmlformats.org/drawingml/2006/main" xmlns:r="http://schemas.openxmlformats.org/officeDocument/2006/relationships" xmlns:p="http://schemas.openxmlformats.org/presentationml/2006/main">
   <p:cSld>
     <p:spTree>
@@ -16532,17 +17270,21 @@
         </p:spPr>
         <p:txBody>
           <a:bodyPr>
-            <a:normAutofit fontScale="90000"/>
+            <a:normAutofit/>
           </a:bodyPr>
           <a:lstStyle/>
           <a:p>
             <a:r>
               <a:rPr lang="en-PH" dirty="0" err="1" smtClean="0"/>
-              <a:t>Github</a:t>
+              <a:t>Git</a:t>
             </a:r>
             <a:r>
               <a:rPr lang="en-PH" dirty="0" smtClean="0"/>
-              <a:t> Version Control of “Team 5”</a:t>
+              <a:t> </a:t>
+            </a:r>
+            <a:r>
+              <a:rPr lang="en-PH" dirty="0" smtClean="0"/>
+              <a:t>Version Control of “Team 5”</a:t>
             </a:r>
             <a:endParaRPr lang="en-PH" dirty="0"/>
           </a:p>
@@ -16598,7 +17340,7 @@
             </a:pPr>
             <a:fld id="{00000000-1234-1234-1234-123412341234}" type="slidenum">
               <a:rPr lang="en-IN" smtClean="0"/>
-              <a:t>15</a:t>
+              <a:t>16</a:t>
             </a:fld>
             <a:endParaRPr lang="en-IN"/>
           </a:p>
@@ -16779,7 +17521,7 @@
         <p:spPr>
           <a:xfrm>
             <a:off x="1069848" y="2121408"/>
-            <a:ext cx="10058400" cy="4050792"/>
+            <a:ext cx="10058400" cy="3051093"/>
           </a:xfrm>
           <a:prstGeom prst="rect">
             <a:avLst/>
@@ -16804,7 +17546,23 @@
             </a:pPr>
             <a:r>
               <a:rPr lang="en-PH" sz="4400" dirty="0" smtClean="0"/>
-              <a:t>A group project tends to know if there is any relationship in temperature and food price index with the export and import in new Zealand.</a:t>
+              <a:t>The</a:t>
+            </a:r>
+            <a:r>
+              <a:rPr lang="en-PH" sz="4400" dirty="0" smtClean="0"/>
+              <a:t> group finding involves any </a:t>
+            </a:r>
+            <a:r>
+              <a:rPr lang="en-PH" sz="4400" dirty="0" smtClean="0"/>
+              <a:t>relationship in </a:t>
+            </a:r>
+            <a:r>
+              <a:rPr lang="en-PH" sz="4400" dirty="0" smtClean="0"/>
+              <a:t>temperature, immigration </a:t>
+            </a:r>
+            <a:r>
+              <a:rPr lang="en-PH" sz="4400" dirty="0" smtClean="0"/>
+              <a:t>and food price index with the export and import in new Zealand.</a:t>
             </a:r>
             <a:endParaRPr sz="4400" dirty="0"/>
           </a:p>

</xml_diff>